<commit_message>
Lecture 10 web api added
</commit_message>
<xml_diff>
--- a/Slides/Lecture10 - Apps part II.pptx
+++ b/Slides/Lecture10 - Apps part II.pptx
@@ -5482,7 +5482,7 @@
         <p:spPr>
           <a:xfrm>
             <a:off x="274209" y="1212850"/>
-            <a:ext cx="8778240" cy="5490734"/>
+            <a:ext cx="8778240" cy="5176802"/>
           </a:xfrm>
         </p:spPr>
         <p:txBody>
@@ -5490,95 +5490,48 @@
           <a:lstStyle/>
           <a:p>
             <a:r>
+              <a:rPr lang="da-DK" dirty="0" err="1">
+                <a:solidFill>
+                  <a:schemeClr val="bg1"/>
+                </a:solidFill>
+              </a:rPr>
+              <a:t>Xamarin.Forms</a:t>
+            </a:r>
+            <a:endParaRPr lang="da-DK" dirty="0">
+              <a:solidFill>
+                <a:schemeClr val="bg1"/>
+              </a:solidFill>
+            </a:endParaRPr>
+          </a:p>
+          <a:p>
+            <a:endParaRPr lang="da-DK" sz="2800" dirty="0">
+              <a:solidFill>
+                <a:schemeClr val="bg1"/>
+              </a:solidFill>
+            </a:endParaRPr>
+          </a:p>
+          <a:p>
+            <a:r>
               <a:rPr lang="da-DK" dirty="0">
                 <a:solidFill>
                   <a:schemeClr val="bg1"/>
                 </a:solidFill>
               </a:rPr>
-              <a:t>More XAML</a:t>
-            </a:r>
-          </a:p>
-          <a:p>
-            <a:r>
-              <a:rPr lang="da-DK" sz="2800" dirty="0">
+              <a:t>Security in ASP.NET, UWP, and </a:t>
+            </a:r>
+            <a:r>
+              <a:rPr lang="da-DK" dirty="0" err="1">
                 <a:solidFill>
                   <a:schemeClr val="bg1"/>
                 </a:solidFill>
               </a:rPr>
-              <a:t>Back </a:t>
-            </a:r>
-            <a:r>
-              <a:rPr lang="da-DK" sz="2800" dirty="0" err="1">
-                <a:solidFill>
-                  <a:schemeClr val="bg1"/>
-                </a:solidFill>
-              </a:rPr>
-              <a:t>button</a:t>
-            </a:r>
-            <a:endParaRPr lang="da-DK" sz="2800" dirty="0">
+              <a:t>Xamarin.Forms</a:t>
+            </a:r>
+            <a:endParaRPr lang="da-DK" dirty="0">
               <a:solidFill>
                 <a:schemeClr val="bg1"/>
               </a:solidFill>
             </a:endParaRPr>
-          </a:p>
-          <a:p>
-            <a:r>
-              <a:rPr lang="da-DK" sz="2800" dirty="0" err="1">
-                <a:solidFill>
-                  <a:schemeClr val="bg1"/>
-                </a:solidFill>
-              </a:rPr>
-              <a:t>Entity</a:t>
-            </a:r>
-            <a:r>
-              <a:rPr lang="da-DK" sz="2800" dirty="0">
-                <a:solidFill>
-                  <a:schemeClr val="bg1"/>
-                </a:solidFill>
-              </a:rPr>
-              <a:t> Framework Core</a:t>
-            </a:r>
-          </a:p>
-          <a:p>
-            <a:r>
-              <a:rPr lang="da-DK" sz="2800" dirty="0" err="1">
-                <a:solidFill>
-                  <a:schemeClr val="bg1"/>
-                </a:solidFill>
-              </a:rPr>
-              <a:t>Dependency</a:t>
-            </a:r>
-            <a:r>
-              <a:rPr lang="da-DK" sz="2800" dirty="0">
-                <a:solidFill>
-                  <a:schemeClr val="bg1"/>
-                </a:solidFill>
-              </a:rPr>
-              <a:t> </a:t>
-            </a:r>
-            <a:r>
-              <a:rPr lang="da-DK" sz="2800" dirty="0" err="1">
-                <a:solidFill>
-                  <a:schemeClr val="bg1"/>
-                </a:solidFill>
-              </a:rPr>
-              <a:t>injection</a:t>
-            </a:r>
-            <a:endParaRPr lang="da-DK" sz="2800" dirty="0">
-              <a:solidFill>
-                <a:schemeClr val="bg1"/>
-              </a:solidFill>
-            </a:endParaRPr>
-          </a:p>
-          <a:p>
-            <a:r>
-              <a:rPr lang="da-DK" sz="2800" dirty="0">
-                <a:solidFill>
-                  <a:schemeClr val="bg1"/>
-                </a:solidFill>
-              </a:rPr>
-              <a:t>Application Manifest</a:t>
-            </a:r>
           </a:p>
           <a:p>
             <a:endParaRPr lang="da-DK" dirty="0">
@@ -5637,7 +5590,7 @@
               <a:t>Final </a:t>
             </a:r>
             <a:r>
-              <a:rPr lang="da-DK">
+              <a:rPr lang="da-DK" dirty="0" err="1">
                 <a:solidFill>
                   <a:schemeClr val="bg1"/>
                 </a:solidFill>
@@ -5928,7 +5881,7 @@
         <p:spPr>
           <a:xfrm>
             <a:off x="274209" y="1212850"/>
-            <a:ext cx="8778240" cy="5558445"/>
+            <a:ext cx="8778240" cy="4339650"/>
           </a:xfrm>
         </p:spPr>
         <p:txBody>
@@ -5954,32 +5907,20 @@
           </a:p>
           <a:p>
             <a:r>
+              <a:rPr lang="da-DK">
+                <a:solidFill>
+                  <a:schemeClr val="bg1"/>
+                </a:solidFill>
+              </a:rPr>
+              <a:t>Publishing </a:t>
+            </a:r>
+            <a:r>
               <a:rPr lang="da-DK" dirty="0">
                 <a:solidFill>
                   <a:schemeClr val="bg1"/>
                 </a:solidFill>
               </a:rPr>
-              <a:t>Security in ASP.NET </a:t>
-            </a:r>
-          </a:p>
-          <a:p>
-            <a:r>
-              <a:rPr lang="da-DK" dirty="0">
-                <a:solidFill>
-                  <a:schemeClr val="bg1"/>
-                </a:solidFill>
-              </a:rPr>
-              <a:t>Security in UWP</a:t>
-            </a:r>
-          </a:p>
-          <a:p>
-            <a:r>
-              <a:rPr lang="da-DK" dirty="0">
-                <a:solidFill>
-                  <a:schemeClr val="bg1"/>
-                </a:solidFill>
-              </a:rPr>
-              <a:t>Publishing apps to the cloud</a:t>
+              <a:t>apps to the cloud</a:t>
             </a:r>
           </a:p>
           <a:p>
@@ -6987,58 +6928,12 @@
 </file>
 
 <file path=customXml/item1.xml><?xml version="1.0" encoding="utf-8"?>
-<p:properties xmlns:p="http://schemas.microsoft.com/office/2006/metadata/properties" xmlns:xsi="http://www.w3.org/2001/XMLSchema-instance" xmlns:pc="http://schemas.microsoft.com/office/infopath/2007/PartnerControls">
-  <documentManagement>
-    <TrackTaxHTField0 xmlns="2295e2e7-0eeb-498e-8716-217bb2ee6ee3">
-      <Terms xmlns="http://schemas.microsoft.com/office/infopath/2007/PartnerControls"/>
-    </TrackTaxHTField0>
-    <CampaignTaxHTField0 xmlns="2295e2e7-0eeb-498e-8716-217bb2ee6ee3">
-      <Terms xmlns="http://schemas.microsoft.com/office/infopath/2007/PartnerControls"/>
-    </CampaignTaxHTField0>
-    <Event_x0020_End_x0020_Date xmlns="2295e2e7-0eeb-498e-8716-217bb2ee6ee3" xsi:nil="true"/>
-    <Event_x0020_Start_x0020_Date xmlns="2295e2e7-0eeb-498e-8716-217bb2ee6ee3" xsi:nil="true"/>
-    <MS_x0020_Speaker xmlns="2295e2e7-0eeb-498e-8716-217bb2ee6ee3">
-      <UserInfo>
-        <DisplayName/>
-        <AccountId xsi:nil="true"/>
-        <AccountType/>
-      </UserInfo>
-    </MS_x0020_Speaker>
-    <External_x0020_Speaker xmlns="2295e2e7-0eeb-498e-8716-217bb2ee6ee3" xsi:nil="true"/>
-    <Session_x0020_Code xmlns="2295e2e7-0eeb-498e-8716-217bb2ee6ee3" xsi:nil="true"/>
-    <ProductTaxHTField0 xmlns="2295e2e7-0eeb-498e-8716-217bb2ee6ee3">
-      <Terms xmlns="http://schemas.microsoft.com/office/infopath/2007/PartnerControls"/>
-    </ProductTaxHTField0>
-    <Presentation_x0020_Date xmlns="2295e2e7-0eeb-498e-8716-217bb2ee6ee3" xsi:nil="true"/>
-    <Event_x0020_LocationTaxHTField0 xmlns="2295e2e7-0eeb-498e-8716-217bb2ee6ee3">
-      <Terms xmlns="http://schemas.microsoft.com/office/infopath/2007/PartnerControls"/>
-    </Event_x0020_LocationTaxHTField0>
-    <Event1TaxHTField0 xmlns="2295e2e7-0eeb-498e-8716-217bb2ee6ee3">
-      <Terms xmlns="http://schemas.microsoft.com/office/infopath/2007/PartnerControls">
-        <TermInfo xmlns="http://schemas.microsoft.com/office/infopath/2007/PartnerControls">
-          <TermName xmlns="http://schemas.microsoft.com/office/infopath/2007/PartnerControls">Unassigned</TermName>
-          <TermId xmlns="http://schemas.microsoft.com/office/infopath/2007/PartnerControls">e51362f4-782c-41a8-bb7b-e0cfc8669933</TermId>
-        </TermInfo>
-      </Terms>
-    </Event1TaxHTField0>
-    <AudienceTaxHTField0 xmlns="8b529f77-48ab-4581-b468-93f09345b8aa">
-      <Terms xmlns="http://schemas.microsoft.com/office/infopath/2007/PartnerControls"/>
-    </AudienceTaxHTField0>
-    <MS_x0020_Content_x0020_Owner xmlns="2295e2e7-0eeb-498e-8716-217bb2ee6ee3">
-      <UserInfo>
-        <DisplayName/>
-        <AccountId xsi:nil="true"/>
-        <AccountType/>
-      </UserInfo>
-    </MS_x0020_Content_x0020_Owner>
-    <TaxCatchAll xmlns="2295e2e7-0eeb-498e-8716-217bb2ee6ee3">
-      <Value>217</Value>
-    </TaxCatchAll>
-    <Event_x0020_VenueTaxHTField0 xmlns="2295e2e7-0eeb-498e-8716-217bb2ee6ee3">
-      <Terms xmlns="http://schemas.microsoft.com/office/infopath/2007/PartnerControls"/>
-    </Event_x0020_VenueTaxHTField0>
-  </documentManagement>
-</p:properties>
+<?mso-contentType ?>
+<FormTemplates xmlns="http://schemas.microsoft.com/sharepoint/v3/contenttype/forms">
+  <Display>DocumentLibraryForm</Display>
+  <Edit>DocumentLibraryForm</Edit>
+  <New>DocumentLibraryForm</New>
+</FormTemplates>
 </file>
 
 <file path=customXml/item2.xml><?xml version="1.0" encoding="utf-8"?>
@@ -7321,27 +7216,64 @@
 </file>
 
 <file path=customXml/item3.xml><?xml version="1.0" encoding="utf-8"?>
-<?mso-contentType ?>
-<FormTemplates xmlns="http://schemas.microsoft.com/sharepoint/v3/contenttype/forms">
-  <Display>DocumentLibraryForm</Display>
-  <Edit>DocumentLibraryForm</Edit>
-  <New>DocumentLibraryForm</New>
-</FormTemplates>
+<p:properties xmlns:p="http://schemas.microsoft.com/office/2006/metadata/properties" xmlns:xsi="http://www.w3.org/2001/XMLSchema-instance" xmlns:pc="http://schemas.microsoft.com/office/infopath/2007/PartnerControls">
+  <documentManagement>
+    <TrackTaxHTField0 xmlns="2295e2e7-0eeb-498e-8716-217bb2ee6ee3">
+      <Terms xmlns="http://schemas.microsoft.com/office/infopath/2007/PartnerControls"/>
+    </TrackTaxHTField0>
+    <CampaignTaxHTField0 xmlns="2295e2e7-0eeb-498e-8716-217bb2ee6ee3">
+      <Terms xmlns="http://schemas.microsoft.com/office/infopath/2007/PartnerControls"/>
+    </CampaignTaxHTField0>
+    <Event_x0020_End_x0020_Date xmlns="2295e2e7-0eeb-498e-8716-217bb2ee6ee3" xsi:nil="true"/>
+    <Event_x0020_Start_x0020_Date xmlns="2295e2e7-0eeb-498e-8716-217bb2ee6ee3" xsi:nil="true"/>
+    <MS_x0020_Speaker xmlns="2295e2e7-0eeb-498e-8716-217bb2ee6ee3">
+      <UserInfo>
+        <DisplayName/>
+        <AccountId xsi:nil="true"/>
+        <AccountType/>
+      </UserInfo>
+    </MS_x0020_Speaker>
+    <External_x0020_Speaker xmlns="2295e2e7-0eeb-498e-8716-217bb2ee6ee3" xsi:nil="true"/>
+    <Session_x0020_Code xmlns="2295e2e7-0eeb-498e-8716-217bb2ee6ee3" xsi:nil="true"/>
+    <ProductTaxHTField0 xmlns="2295e2e7-0eeb-498e-8716-217bb2ee6ee3">
+      <Terms xmlns="http://schemas.microsoft.com/office/infopath/2007/PartnerControls"/>
+    </ProductTaxHTField0>
+    <Presentation_x0020_Date xmlns="2295e2e7-0eeb-498e-8716-217bb2ee6ee3" xsi:nil="true"/>
+    <Event_x0020_LocationTaxHTField0 xmlns="2295e2e7-0eeb-498e-8716-217bb2ee6ee3">
+      <Terms xmlns="http://schemas.microsoft.com/office/infopath/2007/PartnerControls"/>
+    </Event_x0020_LocationTaxHTField0>
+    <Event1TaxHTField0 xmlns="2295e2e7-0eeb-498e-8716-217bb2ee6ee3">
+      <Terms xmlns="http://schemas.microsoft.com/office/infopath/2007/PartnerControls">
+        <TermInfo xmlns="http://schemas.microsoft.com/office/infopath/2007/PartnerControls">
+          <TermName xmlns="http://schemas.microsoft.com/office/infopath/2007/PartnerControls">Unassigned</TermName>
+          <TermId xmlns="http://schemas.microsoft.com/office/infopath/2007/PartnerControls">e51362f4-782c-41a8-bb7b-e0cfc8669933</TermId>
+        </TermInfo>
+      </Terms>
+    </Event1TaxHTField0>
+    <AudienceTaxHTField0 xmlns="8b529f77-48ab-4581-b468-93f09345b8aa">
+      <Terms xmlns="http://schemas.microsoft.com/office/infopath/2007/PartnerControls"/>
+    </AudienceTaxHTField0>
+    <MS_x0020_Content_x0020_Owner xmlns="2295e2e7-0eeb-498e-8716-217bb2ee6ee3">
+      <UserInfo>
+        <DisplayName/>
+        <AccountId xsi:nil="true"/>
+        <AccountType/>
+      </UserInfo>
+    </MS_x0020_Content_x0020_Owner>
+    <TaxCatchAll xmlns="2295e2e7-0eeb-498e-8716-217bb2ee6ee3">
+      <Value>217</Value>
+    </TaxCatchAll>
+    <Event_x0020_VenueTaxHTField0 xmlns="2295e2e7-0eeb-498e-8716-217bb2ee6ee3">
+      <Terms xmlns="http://schemas.microsoft.com/office/infopath/2007/PartnerControls"/>
+    </Event_x0020_VenueTaxHTField0>
+  </documentManagement>
+</p:properties>
 </file>
 
 <file path=customXml/itemProps1.xml><?xml version="1.0" encoding="utf-8"?>
-<ds:datastoreItem xmlns:ds="http://schemas.openxmlformats.org/officeDocument/2006/customXml" ds:itemID="{F990F116-B58F-4255-B05B-DA3808E0E5C6}">
+<ds:datastoreItem xmlns:ds="http://schemas.openxmlformats.org/officeDocument/2006/customXml" ds:itemID="{758FDAC0-319D-4A54-8D8E-1D42CB1F8004}">
   <ds:schemaRefs>
-    <ds:schemaRef ds:uri="2295e2e7-0eeb-498e-8716-217bb2ee6ee3"/>
-    <ds:schemaRef ds:uri="http://purl.org/dc/terms/"/>
-    <ds:schemaRef ds:uri="http://schemas.microsoft.com/office/2006/documentManagement/types"/>
-    <ds:schemaRef ds:uri="http://schemas.microsoft.com/office/infopath/2007/PartnerControls"/>
-    <ds:schemaRef ds:uri="http://purl.org/dc/elements/1.1/"/>
-    <ds:schemaRef ds:uri="http://schemas.microsoft.com/office/2006/metadata/properties"/>
-    <ds:schemaRef ds:uri="8b529f77-48ab-4581-b468-93f09345b8aa"/>
-    <ds:schemaRef ds:uri="http://schemas.openxmlformats.org/package/2006/metadata/core-properties"/>
-    <ds:schemaRef ds:uri="http://www.w3.org/XML/1998/namespace"/>
-    <ds:schemaRef ds:uri="http://purl.org/dc/dcmitype/"/>
+    <ds:schemaRef ds:uri="http://schemas.microsoft.com/sharepoint/v3/contenttype/forms"/>
   </ds:schemaRefs>
 </ds:datastoreItem>
 </file>
@@ -7366,9 +7298,18 @@
 </file>
 
 <file path=customXml/itemProps3.xml><?xml version="1.0" encoding="utf-8"?>
-<ds:datastoreItem xmlns:ds="http://schemas.openxmlformats.org/officeDocument/2006/customXml" ds:itemID="{758FDAC0-319D-4A54-8D8E-1D42CB1F8004}">
+<ds:datastoreItem xmlns:ds="http://schemas.openxmlformats.org/officeDocument/2006/customXml" ds:itemID="{F990F116-B58F-4255-B05B-DA3808E0E5C6}">
   <ds:schemaRefs>
-    <ds:schemaRef ds:uri="http://schemas.microsoft.com/sharepoint/v3/contenttype/forms"/>
+    <ds:schemaRef ds:uri="2295e2e7-0eeb-498e-8716-217bb2ee6ee3"/>
+    <ds:schemaRef ds:uri="http://purl.org/dc/terms/"/>
+    <ds:schemaRef ds:uri="http://schemas.microsoft.com/office/2006/documentManagement/types"/>
+    <ds:schemaRef ds:uri="http://schemas.microsoft.com/office/infopath/2007/PartnerControls"/>
+    <ds:schemaRef ds:uri="http://purl.org/dc/elements/1.1/"/>
+    <ds:schemaRef ds:uri="http://schemas.microsoft.com/office/2006/metadata/properties"/>
+    <ds:schemaRef ds:uri="8b529f77-48ab-4581-b468-93f09345b8aa"/>
+    <ds:schemaRef ds:uri="http://schemas.openxmlformats.org/package/2006/metadata/core-properties"/>
+    <ds:schemaRef ds:uri="http://www.w3.org/XML/1998/namespace"/>
+    <ds:schemaRef ds:uri="http://purl.org/dc/dcmitype/"/>
   </ds:schemaRefs>
 </ds:datastoreItem>
 </file>
</xml_diff>